<commit_message>
Deploy website Tue Nov 15 16:57:06 PST 2022
</commit_message>
<xml_diff>
--- a/assets/slides/fa22/24-Paradigms.pptx
+++ b/assets/slides/fa22/24-Paradigms.pptx
@@ -10098,13 +10098,7 @@
               <a:rPr lang="en-US" sz="1600" dirty="0">
                 <a:latin typeface="Open Sans" panose="020B0606030504020204" pitchFamily="34" charset="0"/>
               </a:rPr>
-              <a:t> partial section of the </a:t>
-            </a:r>
-            <a:r>
-              <a:rPr lang="en-US" sz="1600">
-                <a:latin typeface="Open Sans" panose="020B0606030504020204" pitchFamily="34" charset="0"/>
-              </a:rPr>
-              <a:t>CS88 Website:</a:t>
+              <a:t> partial section of the CS88 Website:</a:t>
             </a:r>
             <a:endParaRPr lang="en-US" sz="1600" b="0" dirty="0">
               <a:effectLst/>
@@ -10457,32 +10451,32 @@
           <a:p>
             <a:pPr lvl="0"/>
             <a:r>
-              <a:rPr lang="en-US"/>
+              <a:rPr lang="en-US" dirty="0"/>
               <a:t>Tell Prolog that colors exist:         Tell Prolog that same colors can’t touch:</a:t>
             </a:r>
           </a:p>
           <a:p>
             <a:pPr lvl="0"/>
-            <a:endParaRPr lang="en-US"/>
+            <a:endParaRPr lang="en-US" dirty="0"/>
           </a:p>
           <a:p>
             <a:pPr lvl="0"/>
-            <a:endParaRPr lang="en-US"/>
+            <a:endParaRPr lang="en-US" dirty="0"/>
           </a:p>
           <a:p>
             <a:pPr lvl="0"/>
-            <a:endParaRPr lang="en-US"/>
+            <a:endParaRPr lang="en-US" dirty="0"/>
           </a:p>
           <a:p>
             <a:pPr lvl="0"/>
             <a:r>
-              <a:rPr lang="en-US"/>
+              <a:rPr lang="en-US" dirty="0"/>
               <a:t>                                                                                </a:t>
             </a:r>
           </a:p>
           <a:p>
             <a:pPr lvl="0"/>
-            <a:endParaRPr lang="en-US"/>
+            <a:endParaRPr lang="en-US" dirty="0"/>
           </a:p>
         </p:txBody>
       </p:sp>
@@ -10530,7 +10524,7 @@
         </p:blipFill>
         <p:spPr>
           <a:xfrm>
-            <a:off x="3657638" y="1104213"/>
+            <a:off x="3809627" y="1234402"/>
             <a:ext cx="4829175" cy="657225"/>
           </a:xfrm>
           <a:prstGeom prst="rect">

</xml_diff>